<commit_message>
Deleted red correction marks
</commit_message>
<xml_diff>
--- a/Drawing Board.pptx
+++ b/Drawing Board.pptx
@@ -4709,23 +4709,7 @@
           <a:p>
             <a:r>
               <a:rPr lang="de-CH" dirty="0"/>
-              <a:t>8 </a:t>
-            </a:r>
-            <a:r>
-              <a:rPr lang="de-CH" dirty="0" err="1"/>
-              <a:t>Pieces</a:t>
-            </a:r>
-            <a:r>
-              <a:rPr lang="de-CH" dirty="0"/>
-              <a:t> </a:t>
-            </a:r>
-            <a:r>
-              <a:rPr lang="de-CH" dirty="0" err="1"/>
-              <a:t>of</a:t>
-            </a:r>
-            <a:r>
-              <a:rPr lang="de-CH" dirty="0"/>
-              <a:t> Tape</a:t>
+              <a:t>8 Pieces of Tape</a:t>
             </a:r>
           </a:p>
         </p:txBody>
@@ -4794,18 +4778,9 @@
           <a:lstStyle/>
           <a:p>
             <a:r>
-              <a:rPr lang="de-CH" dirty="0" err="1"/>
-              <a:t>Silver</a:t>
+              <a:rPr lang="de-CH" dirty="0"/>
+              <a:t>Silver Epoxy</a:t>
             </a:r>
-            <a:r>
-              <a:rPr lang="de-CH" dirty="0"/>
-              <a:t> </a:t>
-            </a:r>
-            <a:r>
-              <a:rPr lang="de-CH" dirty="0" err="1"/>
-              <a:t>Epoxy</a:t>
-            </a:r>
-            <a:endParaRPr lang="de-CH" dirty="0"/>
           </a:p>
         </p:txBody>
       </p:sp>
@@ -4839,29 +4814,8 @@
           <a:p>
             <a:r>
               <a:rPr lang="de-CH" dirty="0"/>
-              <a:t>Cable </a:t>
+              <a:t>Cable with derubberized ends</a:t>
             </a:r>
-            <a:r>
-              <a:rPr lang="de-CH" dirty="0" err="1"/>
-              <a:t>with</a:t>
-            </a:r>
-            <a:r>
-              <a:rPr lang="de-CH" dirty="0"/>
-              <a:t> </a:t>
-            </a:r>
-            <a:r>
-              <a:rPr lang="de-CH" dirty="0" err="1"/>
-              <a:t>derubberized</a:t>
-            </a:r>
-            <a:r>
-              <a:rPr lang="de-CH" dirty="0"/>
-              <a:t> </a:t>
-            </a:r>
-            <a:r>
-              <a:rPr lang="de-CH" dirty="0" err="1"/>
-              <a:t>ends</a:t>
-            </a:r>
-            <a:endParaRPr lang="de-CH" dirty="0"/>
           </a:p>
         </p:txBody>
       </p:sp>
@@ -6765,15 +6719,7 @@
           <a:p>
             <a:r>
               <a:rPr lang="de-CH" sz="1600" dirty="0"/>
-              <a:t>Description </a:t>
-            </a:r>
-            <a:r>
-              <a:rPr lang="de-CH" sz="1600" dirty="0" err="1"/>
-              <a:t>of</a:t>
-            </a:r>
-            <a:r>
-              <a:rPr lang="de-CH" sz="1600" dirty="0"/>
-              <a:t> Sample</a:t>
+              <a:t>Description of Sample</a:t>
             </a:r>
           </a:p>
         </p:txBody>
@@ -8508,15 +8454,7 @@
           <a:p>
             <a:r>
               <a:rPr lang="de-CH" sz="1600" dirty="0"/>
-              <a:t>Description </a:t>
-            </a:r>
-            <a:r>
-              <a:rPr lang="de-CH" sz="1600" dirty="0" err="1"/>
-              <a:t>of</a:t>
-            </a:r>
-            <a:r>
-              <a:rPr lang="de-CH" sz="1600" dirty="0"/>
-              <a:t> Sample</a:t>
+              <a:t>Description of Sample</a:t>
             </a:r>
           </a:p>
         </p:txBody>

</xml_diff>